<commit_message>
Updated midterm progress report
- Added section slides
- Added the project proposal to the repo
</commit_message>
<xml_diff>
--- a/docs/AMDeSS_MidtermProgressReport.pptx
+++ b/docs/AMDeSS_MidtermProgressReport.pptx
@@ -7,9 +7,17 @@
   <p:sldIdLst>
     <p:sldId id="256" r:id="rId2"/>
     <p:sldId id="257" r:id="rId3"/>
-    <p:sldId id="258" r:id="rId4"/>
-    <p:sldId id="259" r:id="rId5"/>
-    <p:sldId id="260" r:id="rId6"/>
+    <p:sldId id="263" r:id="rId4"/>
+    <p:sldId id="262" r:id="rId5"/>
+    <p:sldId id="261" r:id="rId6"/>
+    <p:sldId id="264" r:id="rId7"/>
+    <p:sldId id="258" r:id="rId8"/>
+    <p:sldId id="259" r:id="rId9"/>
+    <p:sldId id="260" r:id="rId10"/>
+    <p:sldId id="265" r:id="rId11"/>
+    <p:sldId id="266" r:id="rId12"/>
+    <p:sldId id="267" r:id="rId13"/>
+    <p:sldId id="268" r:id="rId14"/>
   </p:sldIdLst>
   <p:sldSz cx="12192000" cy="6858000"/>
   <p:notesSz cx="6858000" cy="9144000"/>
@@ -3032,6 +3040,301 @@
   <p:clrMapOvr>
     <a:masterClrMapping/>
   </p:clrMapOvr>
+  <p:timing>
+    <p:tnLst>
+      <p:par>
+        <p:cTn id="1" dur="indefinite" restart="never" nodeType="tmRoot"/>
+      </p:par>
+    </p:tnLst>
+  </p:timing>
+</p:sld>
+</file>
+
+<file path=ppt/slides/slide10.xml><?xml version="1.0" encoding="utf-8"?>
+<p:sld xmlns:a="http://schemas.openxmlformats.org/drawingml/2006/main" xmlns:r="http://schemas.openxmlformats.org/officeDocument/2006/relationships" xmlns:p="http://schemas.openxmlformats.org/presentationml/2006/main">
+  <p:cSld>
+    <p:spTree>
+      <p:nvGrpSpPr>
+        <p:cNvPr id="1" name=""/>
+        <p:cNvGrpSpPr/>
+        <p:nvPr/>
+      </p:nvGrpSpPr>
+      <p:grpSpPr>
+        <a:xfrm>
+          <a:off x="0" y="0"/>
+          <a:ext cx="0" cy="0"/>
+          <a:chOff x="0" y="0"/>
+          <a:chExt cx="0" cy="0"/>
+        </a:xfrm>
+      </p:grpSpPr>
+      <p:sp>
+        <p:nvSpPr>
+          <p:cNvPr id="2" name="Title 1"/>
+          <p:cNvSpPr>
+            <a:spLocks noGrp="1"/>
+          </p:cNvSpPr>
+          <p:nvPr>
+            <p:ph type="title"/>
+          </p:nvPr>
+        </p:nvSpPr>
+        <p:spPr/>
+        <p:txBody>
+          <a:bodyPr/>
+          <a:lstStyle/>
+          <a:p>
+            <a:r>
+              <a:rPr lang="en-US" dirty="0" smtClean="0"/>
+              <a:t>What we’re working on now</a:t>
+            </a:r>
+            <a:endParaRPr lang="en-US" dirty="0"/>
+          </a:p>
+        </p:txBody>
+      </p:sp>
+      <p:sp>
+        <p:nvSpPr>
+          <p:cNvPr id="3" name="Text Placeholder 2"/>
+          <p:cNvSpPr>
+            <a:spLocks noGrp="1"/>
+          </p:cNvSpPr>
+          <p:nvPr>
+            <p:ph type="body" idx="1"/>
+          </p:nvPr>
+        </p:nvSpPr>
+        <p:spPr/>
+        <p:txBody>
+          <a:bodyPr/>
+          <a:lstStyle/>
+          <a:p>
+            <a:endParaRPr lang="en-US"/>
+          </a:p>
+        </p:txBody>
+      </p:sp>
+    </p:spTree>
+    <p:extLst>
+      <p:ext uri="{BB962C8B-B14F-4D97-AF65-F5344CB8AC3E}">
+        <p14:creationId xmlns:p14="http://schemas.microsoft.com/office/powerpoint/2010/main" val="4011490972"/>
+      </p:ext>
+    </p:extLst>
+  </p:cSld>
+  <p:clrMapOvr>
+    <a:masterClrMapping/>
+  </p:clrMapOvr>
+</p:sld>
+</file>
+
+<file path=ppt/slides/slide11.xml><?xml version="1.0" encoding="utf-8"?>
+<p:sld xmlns:a="http://schemas.openxmlformats.org/drawingml/2006/main" xmlns:r="http://schemas.openxmlformats.org/officeDocument/2006/relationships" xmlns:p="http://schemas.openxmlformats.org/presentationml/2006/main">
+  <p:cSld>
+    <p:spTree>
+      <p:nvGrpSpPr>
+        <p:cNvPr id="1" name=""/>
+        <p:cNvGrpSpPr/>
+        <p:nvPr/>
+      </p:nvGrpSpPr>
+      <p:grpSpPr>
+        <a:xfrm>
+          <a:off x="0" y="0"/>
+          <a:ext cx="0" cy="0"/>
+          <a:chOff x="0" y="0"/>
+          <a:chExt cx="0" cy="0"/>
+        </a:xfrm>
+      </p:grpSpPr>
+      <p:sp>
+        <p:nvSpPr>
+          <p:cNvPr id="2" name="Title 1"/>
+          <p:cNvSpPr>
+            <a:spLocks noGrp="1"/>
+          </p:cNvSpPr>
+          <p:nvPr>
+            <p:ph type="title"/>
+          </p:nvPr>
+        </p:nvSpPr>
+        <p:spPr/>
+        <p:txBody>
+          <a:bodyPr/>
+          <a:lstStyle/>
+          <a:p>
+            <a:r>
+              <a:rPr lang="en-US" dirty="0" smtClean="0"/>
+              <a:t>Tasks In Progress</a:t>
+            </a:r>
+            <a:endParaRPr lang="en-US" dirty="0"/>
+          </a:p>
+        </p:txBody>
+      </p:sp>
+      <p:sp>
+        <p:nvSpPr>
+          <p:cNvPr id="3" name="Content Placeholder 2"/>
+          <p:cNvSpPr>
+            <a:spLocks noGrp="1"/>
+          </p:cNvSpPr>
+          <p:nvPr>
+            <p:ph idx="1"/>
+          </p:nvPr>
+        </p:nvSpPr>
+        <p:spPr/>
+        <p:txBody>
+          <a:bodyPr/>
+          <a:lstStyle/>
+          <a:p>
+            <a:endParaRPr lang="en-US" dirty="0"/>
+          </a:p>
+        </p:txBody>
+      </p:sp>
+    </p:spTree>
+    <p:extLst>
+      <p:ext uri="{BB962C8B-B14F-4D97-AF65-F5344CB8AC3E}">
+        <p14:creationId xmlns:p14="http://schemas.microsoft.com/office/powerpoint/2010/main" val="1701579242"/>
+      </p:ext>
+    </p:extLst>
+  </p:cSld>
+  <p:clrMapOvr>
+    <a:masterClrMapping/>
+  </p:clrMapOvr>
+</p:sld>
+</file>
+
+<file path=ppt/slides/slide12.xml><?xml version="1.0" encoding="utf-8"?>
+<p:sld xmlns:a="http://schemas.openxmlformats.org/drawingml/2006/main" xmlns:r="http://schemas.openxmlformats.org/officeDocument/2006/relationships" xmlns:p="http://schemas.openxmlformats.org/presentationml/2006/main">
+  <p:cSld>
+    <p:spTree>
+      <p:nvGrpSpPr>
+        <p:cNvPr id="1" name=""/>
+        <p:cNvGrpSpPr/>
+        <p:nvPr/>
+      </p:nvGrpSpPr>
+      <p:grpSpPr>
+        <a:xfrm>
+          <a:off x="0" y="0"/>
+          <a:ext cx="0" cy="0"/>
+          <a:chOff x="0" y="0"/>
+          <a:chExt cx="0" cy="0"/>
+        </a:xfrm>
+      </p:grpSpPr>
+      <p:sp>
+        <p:nvSpPr>
+          <p:cNvPr id="2" name="Title 1"/>
+          <p:cNvSpPr>
+            <a:spLocks noGrp="1"/>
+          </p:cNvSpPr>
+          <p:nvPr>
+            <p:ph type="title"/>
+          </p:nvPr>
+        </p:nvSpPr>
+        <p:spPr/>
+        <p:txBody>
+          <a:bodyPr/>
+          <a:lstStyle/>
+          <a:p>
+            <a:r>
+              <a:rPr lang="en-US" dirty="0" smtClean="0"/>
+              <a:t>Where we’re going</a:t>
+            </a:r>
+            <a:endParaRPr lang="en-US" dirty="0"/>
+          </a:p>
+        </p:txBody>
+      </p:sp>
+      <p:sp>
+        <p:nvSpPr>
+          <p:cNvPr id="3" name="Text Placeholder 2"/>
+          <p:cNvSpPr>
+            <a:spLocks noGrp="1"/>
+          </p:cNvSpPr>
+          <p:nvPr>
+            <p:ph type="body" idx="1"/>
+          </p:nvPr>
+        </p:nvSpPr>
+        <p:spPr/>
+        <p:txBody>
+          <a:bodyPr/>
+          <a:lstStyle/>
+          <a:p>
+            <a:endParaRPr lang="en-US"/>
+          </a:p>
+        </p:txBody>
+      </p:sp>
+    </p:spTree>
+    <p:extLst>
+      <p:ext uri="{BB962C8B-B14F-4D97-AF65-F5344CB8AC3E}">
+        <p14:creationId xmlns:p14="http://schemas.microsoft.com/office/powerpoint/2010/main" val="4293721982"/>
+      </p:ext>
+    </p:extLst>
+  </p:cSld>
+  <p:clrMapOvr>
+    <a:masterClrMapping/>
+  </p:clrMapOvr>
+</p:sld>
+</file>
+
+<file path=ppt/slides/slide13.xml><?xml version="1.0" encoding="utf-8"?>
+<p:sld xmlns:a="http://schemas.openxmlformats.org/drawingml/2006/main" xmlns:r="http://schemas.openxmlformats.org/officeDocument/2006/relationships" xmlns:p="http://schemas.openxmlformats.org/presentationml/2006/main">
+  <p:cSld>
+    <p:spTree>
+      <p:nvGrpSpPr>
+        <p:cNvPr id="1" name=""/>
+        <p:cNvGrpSpPr/>
+        <p:nvPr/>
+      </p:nvGrpSpPr>
+      <p:grpSpPr>
+        <a:xfrm>
+          <a:off x="0" y="0"/>
+          <a:ext cx="0" cy="0"/>
+          <a:chOff x="0" y="0"/>
+          <a:chExt cx="0" cy="0"/>
+        </a:xfrm>
+      </p:grpSpPr>
+      <p:sp>
+        <p:nvSpPr>
+          <p:cNvPr id="2" name="Title 1"/>
+          <p:cNvSpPr>
+            <a:spLocks noGrp="1"/>
+          </p:cNvSpPr>
+          <p:nvPr>
+            <p:ph type="title"/>
+          </p:nvPr>
+        </p:nvSpPr>
+        <p:spPr/>
+        <p:txBody>
+          <a:bodyPr/>
+          <a:lstStyle/>
+          <a:p>
+            <a:r>
+              <a:rPr lang="en-US" dirty="0" smtClean="0"/>
+              <a:t>Goals for remainder of semester</a:t>
+            </a:r>
+            <a:endParaRPr lang="en-US" dirty="0"/>
+          </a:p>
+        </p:txBody>
+      </p:sp>
+      <p:sp>
+        <p:nvSpPr>
+          <p:cNvPr id="3" name="Content Placeholder 2"/>
+          <p:cNvSpPr>
+            <a:spLocks noGrp="1"/>
+          </p:cNvSpPr>
+          <p:nvPr>
+            <p:ph idx="1"/>
+          </p:nvPr>
+        </p:nvSpPr>
+        <p:spPr/>
+        <p:txBody>
+          <a:bodyPr/>
+          <a:lstStyle/>
+          <a:p>
+            <a:endParaRPr lang="en-US"/>
+          </a:p>
+        </p:txBody>
+      </p:sp>
+    </p:spTree>
+    <p:extLst>
+      <p:ext uri="{BB962C8B-B14F-4D97-AF65-F5344CB8AC3E}">
+        <p14:creationId xmlns:p14="http://schemas.microsoft.com/office/powerpoint/2010/main" val="1608571957"/>
+      </p:ext>
+    </p:extLst>
+  </p:cSld>
+  <p:clrMapOvr>
+    <a:masterClrMapping/>
+  </p:clrMapOvr>
 </p:sld>
 </file>
 
@@ -3094,19 +3397,33 @@
           <a:p>
             <a:r>
               <a:rPr lang="en-US" dirty="0" smtClean="0"/>
-              <a:t>What we’ve done (accomplishments)</a:t>
-            </a:r>
-          </a:p>
-          <a:p>
+              <a:t>The </a:t>
+            </a:r>
+            <a:r>
+              <a:rPr lang="en-US" dirty="0" err="1" smtClean="0"/>
+              <a:t>AMDeSS</a:t>
+            </a:r>
             <a:r>
               <a:rPr lang="en-US" dirty="0" smtClean="0"/>
-              <a:t>Where we are (in-progress tasks)</a:t>
+              <a:t> Concept</a:t>
             </a:r>
           </a:p>
           <a:p>
             <a:r>
               <a:rPr lang="en-US" dirty="0" smtClean="0"/>
-              <a:t>Where we’re going by the end of the semester (goals)</a:t>
+              <a:t>What we’ve accomplished so far</a:t>
+            </a:r>
+          </a:p>
+          <a:p>
+            <a:r>
+              <a:rPr lang="en-US" dirty="0" smtClean="0"/>
+              <a:t>What we’re working on now</a:t>
+            </a:r>
+          </a:p>
+          <a:p>
+            <a:r>
+              <a:rPr lang="en-US" dirty="0" smtClean="0"/>
+              <a:t>Goals for the remainder of the semester</a:t>
             </a:r>
             <a:endParaRPr lang="en-US" dirty="0"/>
           </a:p>
@@ -3122,6 +3439,13 @@
   <p:clrMapOvr>
     <a:masterClrMapping/>
   </p:clrMapOvr>
+  <p:timing>
+    <p:tnLst>
+      <p:par>
+        <p:cTn id="1" dur="indefinite" restart="never" nodeType="tmRoot"/>
+      </p:par>
+    </p:tnLst>
+  </p:timing>
 </p:sld>
 </file>
 
@@ -3159,7 +3483,15 @@
           <a:p>
             <a:r>
               <a:rPr lang="en-US" dirty="0" smtClean="0"/>
-              <a:t>What we’ve done so far</a:t>
+              <a:t>The </a:t>
+            </a:r>
+            <a:r>
+              <a:rPr lang="en-US" dirty="0" err="1" smtClean="0"/>
+              <a:t>AMDeSS</a:t>
+            </a:r>
+            <a:r>
+              <a:rPr lang="en-US" dirty="0" smtClean="0"/>
+              <a:t> Concept</a:t>
             </a:r>
             <a:endParaRPr lang="en-US" dirty="0"/>
           </a:p>
@@ -3167,156 +3499,40 @@
       </p:sp>
       <p:sp>
         <p:nvSpPr>
-          <p:cNvPr id="3" name="Content Placeholder 2"/>
-          <p:cNvSpPr>
-            <a:spLocks noGrp="1"/>
-          </p:cNvSpPr>
-          <p:nvPr>
-            <p:ph idx="1"/>
-          </p:nvPr>
-        </p:nvSpPr>
-        <p:spPr/>
-        <p:txBody>
-          <a:bodyPr>
-            <a:normAutofit fontScale="62500" lnSpcReduction="20000"/>
-          </a:bodyPr>
-          <a:lstStyle/>
-          <a:p>
-            <a:r>
-              <a:rPr lang="en-US" dirty="0" smtClean="0"/>
-              <a:t>Started with the </a:t>
-            </a:r>
-            <a:r>
-              <a:rPr lang="en-US" dirty="0" err="1" smtClean="0"/>
-              <a:t>Jovanov</a:t>
-            </a:r>
-            <a:r>
-              <a:rPr lang="en-US" dirty="0" smtClean="0"/>
-              <a:t> development board (JDB)</a:t>
-            </a:r>
-          </a:p>
-          <a:p>
-            <a:pPr lvl="1"/>
-            <a:r>
-              <a:rPr lang="en-US" dirty="0" smtClean="0"/>
-              <a:t>Attempted Bluetooth connection – device recognized on Laird app</a:t>
-            </a:r>
-          </a:p>
-          <a:p>
-            <a:pPr lvl="1"/>
-            <a:r>
-              <a:rPr lang="en-US" dirty="0" smtClean="0"/>
-              <a:t>Considered trying to program over UART through Teensy board (bad idea)</a:t>
-            </a:r>
-          </a:p>
-          <a:p>
-            <a:pPr lvl="1"/>
-            <a:r>
-              <a:rPr lang="en-US" dirty="0" smtClean="0"/>
-              <a:t>Realized we did not have a way to determine whether or not OTA programming attempts were successful.</a:t>
-            </a:r>
-          </a:p>
-          <a:p>
-            <a:pPr lvl="1"/>
-            <a:r>
-              <a:rPr lang="en-US" dirty="0" smtClean="0"/>
-              <a:t>Decided we needed to start with the Laird development board and then move to OTA programming later</a:t>
-            </a:r>
-          </a:p>
-          <a:p>
-            <a:r>
-              <a:rPr lang="en-US" dirty="0" smtClean="0"/>
-              <a:t>Obtained the Laird development board for the BL600 module</a:t>
-            </a:r>
-          </a:p>
-          <a:p>
-            <a:r>
-              <a:rPr lang="en-US" dirty="0" smtClean="0"/>
-              <a:t>Started learning the Android environment for the smartphone app</a:t>
-            </a:r>
-          </a:p>
-          <a:p>
-            <a:r>
-              <a:rPr lang="en-US" dirty="0" smtClean="0"/>
-              <a:t>Started learning the </a:t>
-            </a:r>
-            <a:r>
-              <a:rPr lang="en-US" dirty="0" err="1" smtClean="0"/>
-              <a:t>smartBASIC</a:t>
-            </a:r>
-            <a:r>
-              <a:rPr lang="en-US" dirty="0" smtClean="0"/>
-              <a:t> language and APIs for the BL600</a:t>
-            </a:r>
-          </a:p>
-          <a:p>
-            <a:r>
-              <a:rPr lang="en-US" dirty="0" smtClean="0"/>
-              <a:t>Developed state diagrams for the sensor device and the smartphone</a:t>
-            </a:r>
-          </a:p>
-          <a:p>
-            <a:r>
-              <a:rPr lang="en-US" dirty="0" smtClean="0"/>
-              <a:t>Learned the basics of BLE communication</a:t>
-            </a:r>
-          </a:p>
-          <a:p>
-            <a:pPr lvl="1"/>
-            <a:r>
-              <a:rPr lang="en-US" dirty="0" smtClean="0"/>
-              <a:t>General protocol overview</a:t>
-            </a:r>
-          </a:p>
-          <a:p>
-            <a:pPr lvl="1"/>
-            <a:r>
-              <a:rPr lang="en-US" dirty="0" smtClean="0"/>
-              <a:t>Android BLE API</a:t>
-            </a:r>
-          </a:p>
-          <a:p>
-            <a:pPr lvl="1"/>
-            <a:r>
-              <a:rPr lang="en-US" dirty="0" err="1" smtClean="0"/>
-              <a:t>smartBASIC</a:t>
-            </a:r>
-            <a:r>
-              <a:rPr lang="en-US" dirty="0" smtClean="0"/>
-              <a:t> BLE API</a:t>
-            </a:r>
-          </a:p>
-          <a:p>
-            <a:pPr lvl="1"/>
-            <a:r>
-              <a:rPr lang="en-US" dirty="0" smtClean="0"/>
-              <a:t>Pairing vs. bonding</a:t>
-            </a:r>
-          </a:p>
-          <a:p>
-            <a:r>
-              <a:rPr lang="en-US" dirty="0" smtClean="0"/>
-              <a:t>Successfully advertised over BLE from BL600 to smartphone</a:t>
-            </a:r>
-          </a:p>
-          <a:p>
-            <a:r>
-              <a:rPr lang="en-US" dirty="0" smtClean="0"/>
-              <a:t>Successfully paired BL600 with smartphone</a:t>
-            </a:r>
+          <p:cNvPr id="3" name="Text Placeholder 2"/>
+          <p:cNvSpPr>
+            <a:spLocks noGrp="1"/>
+          </p:cNvSpPr>
+          <p:nvPr>
+            <p:ph type="body" idx="1"/>
+          </p:nvPr>
+        </p:nvSpPr>
+        <p:spPr/>
+        <p:txBody>
+          <a:bodyPr/>
+          <a:lstStyle/>
+          <a:p>
+            <a:endParaRPr lang="en-US"/>
           </a:p>
         </p:txBody>
       </p:sp>
     </p:spTree>
     <p:extLst>
       <p:ext uri="{BB962C8B-B14F-4D97-AF65-F5344CB8AC3E}">
-        <p14:creationId xmlns:p14="http://schemas.microsoft.com/office/powerpoint/2010/main" val="3562797837"/>
+        <p14:creationId xmlns:p14="http://schemas.microsoft.com/office/powerpoint/2010/main" val="1172724699"/>
       </p:ext>
     </p:extLst>
   </p:cSld>
   <p:clrMapOvr>
     <a:masterClrMapping/>
   </p:clrMapOvr>
+  <p:timing>
+    <p:tnLst>
+      <p:par>
+        <p:cTn id="1" dur="indefinite" restart="never" nodeType="tmRoot"/>
+      </p:par>
+    </p:tnLst>
+  </p:timing>
 </p:sld>
 </file>
 
@@ -3347,6 +3563,610 @@
             <p:ph type="title"/>
           </p:nvPr>
         </p:nvSpPr>
+        <p:spPr/>
+        <p:txBody>
+          <a:bodyPr/>
+          <a:lstStyle/>
+          <a:p>
+            <a:r>
+              <a:rPr lang="en-US" dirty="0" err="1" smtClean="0"/>
+              <a:t>AMDeSS</a:t>
+            </a:r>
+            <a:r>
+              <a:rPr lang="en-US" dirty="0" smtClean="0"/>
+              <a:t> Concept Summary</a:t>
+            </a:r>
+            <a:endParaRPr lang="en-US" dirty="0"/>
+          </a:p>
+        </p:txBody>
+      </p:sp>
+      <p:sp>
+        <p:nvSpPr>
+          <p:cNvPr id="3" name="Content Placeholder 2"/>
+          <p:cNvSpPr>
+            <a:spLocks noGrp="1"/>
+          </p:cNvSpPr>
+          <p:nvPr>
+            <p:ph idx="1"/>
+          </p:nvPr>
+        </p:nvSpPr>
+        <p:spPr/>
+        <p:txBody>
+          <a:bodyPr/>
+          <a:lstStyle/>
+          <a:p>
+            <a:pPr marL="0" indent="0">
+              <a:buNone/>
+            </a:pPr>
+            <a:r>
+              <a:rPr lang="en-US" dirty="0" err="1" smtClean="0"/>
+              <a:t>AMDeSS</a:t>
+            </a:r>
+            <a:r>
+              <a:rPr lang="en-US" dirty="0" smtClean="0"/>
+              <a:t> is a physically attachable, motion-detecting security module that the user can interact with via a smartphone application.</a:t>
+            </a:r>
+            <a:endParaRPr lang="en-US" dirty="0"/>
+          </a:p>
+        </p:txBody>
+      </p:sp>
+    </p:spTree>
+    <p:extLst>
+      <p:ext uri="{BB962C8B-B14F-4D97-AF65-F5344CB8AC3E}">
+        <p14:creationId xmlns:p14="http://schemas.microsoft.com/office/powerpoint/2010/main" val="3914706799"/>
+      </p:ext>
+    </p:extLst>
+  </p:cSld>
+  <p:clrMapOvr>
+    <a:masterClrMapping/>
+  </p:clrMapOvr>
+  <p:timing>
+    <p:tnLst>
+      <p:par>
+        <p:cTn id="1" dur="indefinite" restart="never" nodeType="tmRoot"/>
+      </p:par>
+    </p:tnLst>
+  </p:timing>
+</p:sld>
+</file>
+
+<file path=ppt/slides/slide5.xml><?xml version="1.0" encoding="utf-8"?>
+<p:sld xmlns:a="http://schemas.openxmlformats.org/drawingml/2006/main" xmlns:r="http://schemas.openxmlformats.org/officeDocument/2006/relationships" xmlns:p="http://schemas.openxmlformats.org/presentationml/2006/main">
+  <p:cSld>
+    <p:spTree>
+      <p:nvGrpSpPr>
+        <p:cNvPr id="1" name=""/>
+        <p:cNvGrpSpPr/>
+        <p:nvPr/>
+      </p:nvGrpSpPr>
+      <p:grpSpPr>
+        <a:xfrm>
+          <a:off x="0" y="0"/>
+          <a:ext cx="0" cy="0"/>
+          <a:chOff x="0" y="0"/>
+          <a:chExt cx="0" cy="0"/>
+        </a:xfrm>
+      </p:grpSpPr>
+      <p:sp>
+        <p:nvSpPr>
+          <p:cNvPr id="2" name="Title 1"/>
+          <p:cNvSpPr>
+            <a:spLocks noGrp="1"/>
+          </p:cNvSpPr>
+          <p:nvPr>
+            <p:ph type="title"/>
+          </p:nvPr>
+        </p:nvSpPr>
+        <p:spPr/>
+        <p:txBody>
+          <a:bodyPr/>
+          <a:lstStyle/>
+          <a:p>
+            <a:r>
+              <a:rPr lang="en-US" dirty="0" err="1" smtClean="0"/>
+              <a:t>AMDeSS</a:t>
+            </a:r>
+            <a:r>
+              <a:rPr lang="en-US" dirty="0" smtClean="0"/>
+              <a:t> Use Case</a:t>
+            </a:r>
+            <a:endParaRPr lang="en-US" dirty="0"/>
+          </a:p>
+        </p:txBody>
+      </p:sp>
+      <p:sp>
+        <p:nvSpPr>
+          <p:cNvPr id="3" name="Content Placeholder 2"/>
+          <p:cNvSpPr>
+            <a:spLocks noGrp="1"/>
+          </p:cNvSpPr>
+          <p:nvPr>
+            <p:ph idx="1"/>
+          </p:nvPr>
+        </p:nvSpPr>
+        <p:spPr/>
+        <p:txBody>
+          <a:bodyPr>
+            <a:normAutofit fontScale="92500"/>
+          </a:bodyPr>
+          <a:lstStyle/>
+          <a:p>
+            <a:pPr marL="514350" indent="-514350">
+              <a:buFont typeface="+mj-lt"/>
+              <a:buAutoNum type="arabicPeriod"/>
+            </a:pPr>
+            <a:r>
+              <a:rPr lang="en-US" dirty="0" smtClean="0"/>
+              <a:t>User configures </a:t>
+            </a:r>
+            <a:r>
+              <a:rPr lang="en-US" dirty="0" err="1" smtClean="0"/>
+              <a:t>AMDeSS</a:t>
+            </a:r>
+            <a:r>
+              <a:rPr lang="en-US" dirty="0" smtClean="0"/>
+              <a:t> device via smartphone app</a:t>
+            </a:r>
+          </a:p>
+          <a:p>
+            <a:pPr marL="514350" indent="-514350">
+              <a:buFont typeface="+mj-lt"/>
+              <a:buAutoNum type="arabicPeriod"/>
+            </a:pPr>
+            <a:r>
+              <a:rPr lang="en-US" dirty="0" smtClean="0"/>
+              <a:t>User attaches </a:t>
+            </a:r>
+            <a:r>
+              <a:rPr lang="en-US" dirty="0" err="1" smtClean="0"/>
+              <a:t>AMDeSS</a:t>
+            </a:r>
+            <a:r>
+              <a:rPr lang="en-US" dirty="0" smtClean="0"/>
+              <a:t> device in desired location (on door, window, etc.)</a:t>
+            </a:r>
+          </a:p>
+          <a:p>
+            <a:pPr marL="514350" indent="-514350">
+              <a:buFont typeface="+mj-lt"/>
+              <a:buAutoNum type="arabicPeriod"/>
+            </a:pPr>
+            <a:r>
+              <a:rPr lang="en-US" dirty="0" smtClean="0"/>
+              <a:t>User arms the </a:t>
+            </a:r>
+            <a:r>
+              <a:rPr lang="en-US" dirty="0" err="1" smtClean="0"/>
+              <a:t>AMDeSS</a:t>
+            </a:r>
+            <a:r>
+              <a:rPr lang="en-US" dirty="0" smtClean="0"/>
+              <a:t> device from smartphone app</a:t>
+            </a:r>
+          </a:p>
+          <a:p>
+            <a:pPr marL="514350" indent="-514350">
+              <a:buFont typeface="+mj-lt"/>
+              <a:buAutoNum type="arabicPeriod"/>
+            </a:pPr>
+            <a:r>
+              <a:rPr lang="en-US" dirty="0" smtClean="0"/>
+              <a:t>When </a:t>
+            </a:r>
+            <a:r>
+              <a:rPr lang="en-US" dirty="0" err="1" smtClean="0"/>
+              <a:t>AMDeSS</a:t>
+            </a:r>
+            <a:r>
+              <a:rPr lang="en-US" dirty="0" smtClean="0"/>
+              <a:t> device is physically displaced, an alert is sent to the smartphone app and the user is notified</a:t>
+            </a:r>
+          </a:p>
+          <a:p>
+            <a:pPr marL="514350" indent="-514350">
+              <a:buFont typeface="+mj-lt"/>
+              <a:buAutoNum type="arabicPeriod"/>
+            </a:pPr>
+            <a:r>
+              <a:rPr lang="en-US" dirty="0" smtClean="0"/>
+              <a:t>User acknowledges the alert/disarms the </a:t>
+            </a:r>
+            <a:r>
+              <a:rPr lang="en-US" dirty="0" err="1" smtClean="0"/>
+              <a:t>AMDeSS</a:t>
+            </a:r>
+            <a:r>
+              <a:rPr lang="en-US" dirty="0" smtClean="0"/>
+              <a:t> device</a:t>
+            </a:r>
+            <a:endParaRPr lang="en-US" dirty="0" smtClean="0"/>
+          </a:p>
+          <a:p>
+            <a:pPr marL="514350" indent="-514350">
+              <a:buFont typeface="+mj-lt"/>
+              <a:buAutoNum type="arabicPeriod"/>
+            </a:pPr>
+            <a:r>
+              <a:rPr lang="en-US" dirty="0" smtClean="0"/>
+              <a:t>User takes appropriate action at his discretion</a:t>
+            </a:r>
+          </a:p>
+          <a:p>
+            <a:pPr marL="971550" lvl="1" indent="-514350">
+              <a:buFont typeface="+mj-lt"/>
+              <a:buAutoNum type="alphaLcPeriod"/>
+            </a:pPr>
+            <a:r>
+              <a:rPr lang="en-US" dirty="0" smtClean="0"/>
+              <a:t>Ignore alert and re-arm device</a:t>
+            </a:r>
+          </a:p>
+          <a:p>
+            <a:pPr marL="971550" lvl="1" indent="-514350">
+              <a:buFont typeface="+mj-lt"/>
+              <a:buAutoNum type="alphaLcPeriod"/>
+            </a:pPr>
+            <a:r>
+              <a:rPr lang="en-US" dirty="0" smtClean="0"/>
+              <a:t>Command </a:t>
+            </a:r>
+            <a:r>
+              <a:rPr lang="en-US" dirty="0" err="1" smtClean="0"/>
+              <a:t>AMDeSS</a:t>
+            </a:r>
+            <a:r>
+              <a:rPr lang="en-US" dirty="0" smtClean="0"/>
+              <a:t> device to panic</a:t>
+            </a:r>
+          </a:p>
+          <a:p>
+            <a:pPr marL="971550" lvl="1" indent="-514350">
+              <a:buFont typeface="+mj-lt"/>
+              <a:buAutoNum type="alphaLcPeriod"/>
+            </a:pPr>
+            <a:r>
+              <a:rPr lang="en-US" dirty="0" smtClean="0"/>
+              <a:t>Silence </a:t>
+            </a:r>
+            <a:r>
+              <a:rPr lang="en-US" dirty="0" err="1" smtClean="0"/>
+              <a:t>AMDeSS</a:t>
+            </a:r>
+            <a:r>
+              <a:rPr lang="en-US" dirty="0" smtClean="0"/>
+              <a:t> device (if already in panic mode)</a:t>
+            </a:r>
+          </a:p>
+        </p:txBody>
+      </p:sp>
+    </p:spTree>
+    <p:extLst>
+      <p:ext uri="{BB962C8B-B14F-4D97-AF65-F5344CB8AC3E}">
+        <p14:creationId xmlns:p14="http://schemas.microsoft.com/office/powerpoint/2010/main" val="2502472449"/>
+      </p:ext>
+    </p:extLst>
+  </p:cSld>
+  <p:clrMapOvr>
+    <a:masterClrMapping/>
+  </p:clrMapOvr>
+  <p:timing>
+    <p:tnLst>
+      <p:par>
+        <p:cTn id="1" dur="indefinite" restart="never" nodeType="tmRoot"/>
+      </p:par>
+    </p:tnLst>
+  </p:timing>
+</p:sld>
+</file>
+
+<file path=ppt/slides/slide6.xml><?xml version="1.0" encoding="utf-8"?>
+<p:sld xmlns:a="http://schemas.openxmlformats.org/drawingml/2006/main" xmlns:r="http://schemas.openxmlformats.org/officeDocument/2006/relationships" xmlns:p="http://schemas.openxmlformats.org/presentationml/2006/main">
+  <p:cSld>
+    <p:spTree>
+      <p:nvGrpSpPr>
+        <p:cNvPr id="1" name=""/>
+        <p:cNvGrpSpPr/>
+        <p:nvPr/>
+      </p:nvGrpSpPr>
+      <p:grpSpPr>
+        <a:xfrm>
+          <a:off x="0" y="0"/>
+          <a:ext cx="0" cy="0"/>
+          <a:chOff x="0" y="0"/>
+          <a:chExt cx="0" cy="0"/>
+        </a:xfrm>
+      </p:grpSpPr>
+      <p:sp>
+        <p:nvSpPr>
+          <p:cNvPr id="2" name="Title 1"/>
+          <p:cNvSpPr>
+            <a:spLocks noGrp="1"/>
+          </p:cNvSpPr>
+          <p:nvPr>
+            <p:ph type="title"/>
+          </p:nvPr>
+        </p:nvSpPr>
+        <p:spPr/>
+        <p:txBody>
+          <a:bodyPr/>
+          <a:lstStyle/>
+          <a:p>
+            <a:r>
+              <a:rPr lang="en-US" dirty="0" smtClean="0"/>
+              <a:t>What we’ve done so far</a:t>
+            </a:r>
+            <a:endParaRPr lang="en-US" dirty="0"/>
+          </a:p>
+        </p:txBody>
+      </p:sp>
+      <p:sp>
+        <p:nvSpPr>
+          <p:cNvPr id="3" name="Text Placeholder 2"/>
+          <p:cNvSpPr>
+            <a:spLocks noGrp="1"/>
+          </p:cNvSpPr>
+          <p:nvPr>
+            <p:ph type="body" idx="1"/>
+          </p:nvPr>
+        </p:nvSpPr>
+        <p:spPr/>
+        <p:txBody>
+          <a:bodyPr/>
+          <a:lstStyle/>
+          <a:p>
+            <a:endParaRPr lang="en-US"/>
+          </a:p>
+        </p:txBody>
+      </p:sp>
+    </p:spTree>
+    <p:extLst>
+      <p:ext uri="{BB962C8B-B14F-4D97-AF65-F5344CB8AC3E}">
+        <p14:creationId xmlns:p14="http://schemas.microsoft.com/office/powerpoint/2010/main" val="1331718950"/>
+      </p:ext>
+    </p:extLst>
+  </p:cSld>
+  <p:clrMapOvr>
+    <a:masterClrMapping/>
+  </p:clrMapOvr>
+  <p:timing>
+    <p:tnLst>
+      <p:par>
+        <p:cTn id="1" dur="indefinite" restart="never" nodeType="tmRoot"/>
+      </p:par>
+    </p:tnLst>
+  </p:timing>
+</p:sld>
+</file>
+
+<file path=ppt/slides/slide7.xml><?xml version="1.0" encoding="utf-8"?>
+<p:sld xmlns:a="http://schemas.openxmlformats.org/drawingml/2006/main" xmlns:r="http://schemas.openxmlformats.org/officeDocument/2006/relationships" xmlns:p="http://schemas.openxmlformats.org/presentationml/2006/main">
+  <p:cSld>
+    <p:spTree>
+      <p:nvGrpSpPr>
+        <p:cNvPr id="1" name=""/>
+        <p:cNvGrpSpPr/>
+        <p:nvPr/>
+      </p:nvGrpSpPr>
+      <p:grpSpPr>
+        <a:xfrm>
+          <a:off x="0" y="0"/>
+          <a:ext cx="0" cy="0"/>
+          <a:chOff x="0" y="0"/>
+          <a:chExt cx="0" cy="0"/>
+        </a:xfrm>
+      </p:grpSpPr>
+      <p:sp>
+        <p:nvSpPr>
+          <p:cNvPr id="2" name="Title 1"/>
+          <p:cNvSpPr>
+            <a:spLocks noGrp="1"/>
+          </p:cNvSpPr>
+          <p:nvPr>
+            <p:ph type="title"/>
+          </p:nvPr>
+        </p:nvSpPr>
+        <p:spPr/>
+        <p:txBody>
+          <a:bodyPr/>
+          <a:lstStyle/>
+          <a:p>
+            <a:r>
+              <a:rPr lang="en-US" dirty="0" smtClean="0"/>
+              <a:t>Accomplishments</a:t>
+            </a:r>
+            <a:endParaRPr lang="en-US" dirty="0"/>
+          </a:p>
+        </p:txBody>
+      </p:sp>
+      <p:sp>
+        <p:nvSpPr>
+          <p:cNvPr id="3" name="Content Placeholder 2"/>
+          <p:cNvSpPr>
+            <a:spLocks noGrp="1"/>
+          </p:cNvSpPr>
+          <p:nvPr>
+            <p:ph idx="1"/>
+          </p:nvPr>
+        </p:nvSpPr>
+        <p:spPr/>
+        <p:txBody>
+          <a:bodyPr>
+            <a:normAutofit fontScale="62500" lnSpcReduction="20000"/>
+          </a:bodyPr>
+          <a:lstStyle/>
+          <a:p>
+            <a:r>
+              <a:rPr lang="en-US" dirty="0" smtClean="0"/>
+              <a:t>Started with the </a:t>
+            </a:r>
+            <a:r>
+              <a:rPr lang="en-US" dirty="0" err="1" smtClean="0"/>
+              <a:t>Jovanov</a:t>
+            </a:r>
+            <a:r>
+              <a:rPr lang="en-US" dirty="0" smtClean="0"/>
+              <a:t> development board (JDB)</a:t>
+            </a:r>
+          </a:p>
+          <a:p>
+            <a:pPr lvl="1"/>
+            <a:r>
+              <a:rPr lang="en-US" dirty="0" smtClean="0"/>
+              <a:t>Attempted Bluetooth connection – device recognized on Laird app</a:t>
+            </a:r>
+          </a:p>
+          <a:p>
+            <a:pPr lvl="1"/>
+            <a:r>
+              <a:rPr lang="en-US" dirty="0" smtClean="0"/>
+              <a:t>Considered trying to program over UART through Teensy board (bad idea)</a:t>
+            </a:r>
+          </a:p>
+          <a:p>
+            <a:pPr lvl="1"/>
+            <a:r>
+              <a:rPr lang="en-US" dirty="0" smtClean="0"/>
+              <a:t>Realized we did not have a way to determine whether or not OTA programming attempts were successful.</a:t>
+            </a:r>
+          </a:p>
+          <a:p>
+            <a:pPr lvl="1"/>
+            <a:r>
+              <a:rPr lang="en-US" dirty="0" smtClean="0"/>
+              <a:t>Decided we needed to start with the Laird development board and then move to OTA programming later</a:t>
+            </a:r>
+          </a:p>
+          <a:p>
+            <a:r>
+              <a:rPr lang="en-US" dirty="0" smtClean="0"/>
+              <a:t>Obtained the Laird development board for the BL600 module</a:t>
+            </a:r>
+          </a:p>
+          <a:p>
+            <a:r>
+              <a:rPr lang="en-US" dirty="0" smtClean="0"/>
+              <a:t>Started learning the Android environment for the smartphone app</a:t>
+            </a:r>
+          </a:p>
+          <a:p>
+            <a:r>
+              <a:rPr lang="en-US" dirty="0" smtClean="0"/>
+              <a:t>Started learning the </a:t>
+            </a:r>
+            <a:r>
+              <a:rPr lang="en-US" dirty="0" err="1" smtClean="0"/>
+              <a:t>smartBASIC</a:t>
+            </a:r>
+            <a:r>
+              <a:rPr lang="en-US" dirty="0" smtClean="0"/>
+              <a:t> language and APIs for the BL600</a:t>
+            </a:r>
+          </a:p>
+          <a:p>
+            <a:r>
+              <a:rPr lang="en-US" dirty="0" smtClean="0"/>
+              <a:t>Developed state diagrams for the sensor device and the smartphone</a:t>
+            </a:r>
+          </a:p>
+          <a:p>
+            <a:r>
+              <a:rPr lang="en-US" dirty="0" smtClean="0"/>
+              <a:t>Learned the basics of BLE communication</a:t>
+            </a:r>
+          </a:p>
+          <a:p>
+            <a:pPr lvl="1"/>
+            <a:r>
+              <a:rPr lang="en-US" dirty="0" smtClean="0"/>
+              <a:t>General protocol overview</a:t>
+            </a:r>
+          </a:p>
+          <a:p>
+            <a:pPr lvl="1"/>
+            <a:r>
+              <a:rPr lang="en-US" dirty="0" smtClean="0"/>
+              <a:t>Android BLE API</a:t>
+            </a:r>
+          </a:p>
+          <a:p>
+            <a:pPr lvl="1"/>
+            <a:r>
+              <a:rPr lang="en-US" dirty="0" err="1" smtClean="0"/>
+              <a:t>smartBASIC</a:t>
+            </a:r>
+            <a:r>
+              <a:rPr lang="en-US" dirty="0" smtClean="0"/>
+              <a:t> BLE API</a:t>
+            </a:r>
+          </a:p>
+          <a:p>
+            <a:pPr lvl="1"/>
+            <a:r>
+              <a:rPr lang="en-US" dirty="0" smtClean="0"/>
+              <a:t>Pairing vs. bonding</a:t>
+            </a:r>
+          </a:p>
+          <a:p>
+            <a:r>
+              <a:rPr lang="en-US" dirty="0" smtClean="0"/>
+              <a:t>Successfully advertised over BLE from BL600 to smartphone</a:t>
+            </a:r>
+          </a:p>
+          <a:p>
+            <a:r>
+              <a:rPr lang="en-US" dirty="0" smtClean="0"/>
+              <a:t>Successfully paired BL600 with smartphone</a:t>
+            </a:r>
+          </a:p>
+        </p:txBody>
+      </p:sp>
+    </p:spTree>
+    <p:extLst>
+      <p:ext uri="{BB962C8B-B14F-4D97-AF65-F5344CB8AC3E}">
+        <p14:creationId xmlns:p14="http://schemas.microsoft.com/office/powerpoint/2010/main" val="3562797837"/>
+      </p:ext>
+    </p:extLst>
+  </p:cSld>
+  <p:clrMapOvr>
+    <a:masterClrMapping/>
+  </p:clrMapOvr>
+  <p:timing>
+    <p:tnLst>
+      <p:par>
+        <p:cTn id="1" dur="indefinite" restart="never" nodeType="tmRoot"/>
+      </p:par>
+    </p:tnLst>
+  </p:timing>
+</p:sld>
+</file>
+
+<file path=ppt/slides/slide8.xml><?xml version="1.0" encoding="utf-8"?>
+<p:sld xmlns:a="http://schemas.openxmlformats.org/drawingml/2006/main" xmlns:r="http://schemas.openxmlformats.org/officeDocument/2006/relationships" xmlns:p="http://schemas.openxmlformats.org/presentationml/2006/main">
+  <p:cSld>
+    <p:spTree>
+      <p:nvGrpSpPr>
+        <p:cNvPr id="1" name=""/>
+        <p:cNvGrpSpPr/>
+        <p:nvPr/>
+      </p:nvGrpSpPr>
+      <p:grpSpPr>
+        <a:xfrm>
+          <a:off x="0" y="0"/>
+          <a:ext cx="0" cy="0"/>
+          <a:chOff x="0" y="0"/>
+          <a:chExt cx="0" cy="0"/>
+        </a:xfrm>
+      </p:grpSpPr>
+      <p:sp>
+        <p:nvSpPr>
+          <p:cNvPr id="2" name="Title 1"/>
+          <p:cNvSpPr>
+            <a:spLocks noGrp="1"/>
+          </p:cNvSpPr>
+          <p:nvPr>
+            <p:ph type="title"/>
+          </p:nvPr>
+        </p:nvSpPr>
         <p:spPr>
           <a:solidFill>
             <a:srgbClr val="FFFF00"/>
@@ -3393,10 +4213,17 @@
   <p:clrMapOvr>
     <a:masterClrMapping/>
   </p:clrMapOvr>
+  <p:timing>
+    <p:tnLst>
+      <p:par>
+        <p:cTn id="1" dur="indefinite" restart="never" nodeType="tmRoot"/>
+      </p:par>
+    </p:tnLst>
+  </p:timing>
 </p:sld>
 </file>
 
-<file path=ppt/slides/slide5.xml><?xml version="1.0" encoding="utf-8"?>
+<file path=ppt/slides/slide9.xml><?xml version="1.0" encoding="utf-8"?>
 <p:sld xmlns:a="http://schemas.openxmlformats.org/drawingml/2006/main" xmlns:r="http://schemas.openxmlformats.org/officeDocument/2006/relationships" xmlns:p="http://schemas.openxmlformats.org/presentationml/2006/main">
   <p:cSld>
     <p:spTree>
@@ -4781,6 +5608,13 @@
   <p:clrMapOvr>
     <a:masterClrMapping/>
   </p:clrMapOvr>
+  <p:timing>
+    <p:tnLst>
+      <p:par>
+        <p:cTn id="1" dur="indefinite" restart="never" nodeType="tmRoot"/>
+      </p:par>
+    </p:tnLst>
+  </p:timing>
 </p:sld>
 </file>
 

</xml_diff>

<commit_message>
Added some outstanding issues
Questions for Dr. Jovanov (should they be in our presentation?)
</commit_message>
<xml_diff>
--- a/docs/AMDeSS_MidtermProgressReport.pptx
+++ b/docs/AMDeSS_MidtermProgressReport.pptx
@@ -18,7 +18,8 @@
     <p:sldId id="266" r:id="rId12"/>
     <p:sldId id="267" r:id="rId13"/>
     <p:sldId id="268" r:id="rId14"/>
-    <p:sldId id="269" r:id="rId15"/>
+    <p:sldId id="270" r:id="rId15"/>
+    <p:sldId id="269" r:id="rId16"/>
   </p:sldIdLst>
   <p:sldSz cx="12192000" cy="6858000"/>
   <p:notesSz cx="6858000" cy="9144000"/>
@@ -3397,6 +3398,52 @@
             </a:r>
           </a:p>
           <a:p>
+            <a:r>
+              <a:rPr lang="en-US" dirty="0" smtClean="0">
+                <a:solidFill>
+                  <a:srgbClr val="FF0000"/>
+                </a:solidFill>
+              </a:rPr>
+              <a:t>User can name device</a:t>
+            </a:r>
+          </a:p>
+          <a:p>
+            <a:r>
+              <a:rPr lang="en-US" dirty="0" smtClean="0">
+                <a:solidFill>
+                  <a:srgbClr val="FF0000"/>
+                </a:solidFill>
+              </a:rPr>
+              <a:t>User can add multiple devices</a:t>
+            </a:r>
+          </a:p>
+          <a:p>
+            <a:r>
+              <a:rPr lang="en-US" dirty="0" err="1" smtClean="0">
+                <a:solidFill>
+                  <a:srgbClr val="FF0000"/>
+                </a:solidFill>
+              </a:rPr>
+              <a:t>Wifi</a:t>
+            </a:r>
+            <a:r>
+              <a:rPr lang="en-US" dirty="0">
+                <a:solidFill>
+                  <a:srgbClr val="FF0000"/>
+                </a:solidFill>
+              </a:rPr>
+              <a:t> </a:t>
+            </a:r>
+            <a:r>
+              <a:rPr lang="en-US" dirty="0" smtClean="0">
+                <a:solidFill>
+                  <a:srgbClr val="FF0000"/>
+                </a:solidFill>
+              </a:rPr>
+              <a:t>mode</a:t>
+            </a:r>
+          </a:p>
+          <a:p>
             <a:endParaRPr lang="en-US" dirty="0" smtClean="0"/>
           </a:p>
           <a:p>
@@ -3425,6 +3472,95 @@
 </file>
 
 <file path=ppt/slides/slide14.xml><?xml version="1.0" encoding="utf-8"?>
+<p:sld xmlns:a="http://schemas.openxmlformats.org/drawingml/2006/main" xmlns:r="http://schemas.openxmlformats.org/officeDocument/2006/relationships" xmlns:p="http://schemas.openxmlformats.org/presentationml/2006/main">
+  <p:cSld>
+    <p:spTree>
+      <p:nvGrpSpPr>
+        <p:cNvPr id="1" name=""/>
+        <p:cNvGrpSpPr/>
+        <p:nvPr/>
+      </p:nvGrpSpPr>
+      <p:grpSpPr>
+        <a:xfrm>
+          <a:off x="0" y="0"/>
+          <a:ext cx="0" cy="0"/>
+          <a:chOff x="0" y="0"/>
+          <a:chExt cx="0" cy="0"/>
+        </a:xfrm>
+      </p:grpSpPr>
+      <p:sp>
+        <p:nvSpPr>
+          <p:cNvPr id="2" name="Title 1"/>
+          <p:cNvSpPr>
+            <a:spLocks noGrp="1"/>
+          </p:cNvSpPr>
+          <p:nvPr>
+            <p:ph type="title"/>
+          </p:nvPr>
+        </p:nvSpPr>
+        <p:spPr/>
+        <p:txBody>
+          <a:bodyPr/>
+          <a:lstStyle/>
+          <a:p>
+            <a:r>
+              <a:rPr lang="en-US" dirty="0" smtClean="0"/>
+              <a:t>Outstanding Issues/Questions</a:t>
+            </a:r>
+            <a:endParaRPr lang="en-US" dirty="0"/>
+          </a:p>
+        </p:txBody>
+      </p:sp>
+      <p:sp>
+        <p:nvSpPr>
+          <p:cNvPr id="3" name="Content Placeholder 2"/>
+          <p:cNvSpPr>
+            <a:spLocks noGrp="1"/>
+          </p:cNvSpPr>
+          <p:nvPr>
+            <p:ph idx="1"/>
+          </p:nvPr>
+        </p:nvSpPr>
+        <p:spPr/>
+        <p:txBody>
+          <a:bodyPr/>
+          <a:lstStyle/>
+          <a:p>
+            <a:r>
+              <a:rPr lang="en-US" dirty="0" smtClean="0">
+                <a:solidFill>
+                  <a:srgbClr val="FF0000"/>
+                </a:solidFill>
+              </a:rPr>
+              <a:t>What are the requirements/expectations for the paper?</a:t>
+            </a:r>
+          </a:p>
+          <a:p>
+            <a:r>
+              <a:rPr lang="en-US" dirty="0" smtClean="0">
+                <a:solidFill>
+                  <a:srgbClr val="FF0000"/>
+                </a:solidFill>
+              </a:rPr>
+              <a:t>Which goals are critical and which are stretch goals?</a:t>
+            </a:r>
+          </a:p>
+        </p:txBody>
+      </p:sp>
+    </p:spTree>
+    <p:extLst>
+      <p:ext uri="{BB962C8B-B14F-4D97-AF65-F5344CB8AC3E}">
+        <p14:creationId xmlns:p14="http://schemas.microsoft.com/office/powerpoint/2010/main" val="2756157827"/>
+      </p:ext>
+    </p:extLst>
+  </p:cSld>
+  <p:clrMapOvr>
+    <a:masterClrMapping/>
+  </p:clrMapOvr>
+</p:sld>
+</file>
+
+<file path=ppt/slides/slide15.xml><?xml version="1.0" encoding="utf-8"?>
 <p:sld xmlns:a="http://schemas.openxmlformats.org/drawingml/2006/main" xmlns:r="http://schemas.openxmlformats.org/officeDocument/2006/relationships" xmlns:p="http://schemas.openxmlformats.org/presentationml/2006/main">
   <p:cSld>
     <p:spTree>

</xml_diff>